<commit_message>
Update HWR Presentation Final.pptx
</commit_message>
<xml_diff>
--- a/Presentation/HWR Presentation Final.pptx
+++ b/Presentation/HWR Presentation Final.pptx
@@ -1240,7 +1240,7 @@
           <a:p>
             <a:fld id="{95997885-7558-924A-A0EE-BDDA4276B484}" type="datetimeFigureOut">
               <a:rPr lang="en-US" smtClean="0"/>
-              <a:t>3/26/2021</a:t>
+              <a:t>3/31/21</a:t>
             </a:fld>
             <a:endParaRPr lang="en-US"/>
           </a:p>
@@ -4567,16 +4567,14 @@
           <a:lstStyle/>
           <a:p>
             <a:r>
+              <a:rPr lang="en-US" sz="5000" dirty="0"/>
+              <a:t>Handwriting </a:t>
+            </a:r>
+            <a:r>
               <a:rPr lang="en-US" sz="5000"/>
-              <a:t>Handwriting Recognition</a:t>
-            </a:r>
-            <a:br>
-              <a:rPr lang="en-US" sz="5000"/>
-            </a:br>
-            <a:r>
-              <a:rPr lang="en-US" sz="5000"/>
-              <a:t>(HWR) </a:t>
-            </a:r>
+              <a:t>Digit Recognition</a:t>
+            </a:r>
+            <a:endParaRPr lang="en-US" sz="5000" dirty="0"/>
           </a:p>
         </p:txBody>
       </p:sp>
@@ -4902,7 +4900,7 @@
               </a:lnSpc>
             </a:pPr>
             <a:r>
-              <a:rPr lang="en-US" sz="2400"/>
+              <a:rPr lang="en-US" sz="2400" dirty="0"/>
               <a:t>Bank Cheque, Application form, Exam answer paper</a:t>
             </a:r>
           </a:p>
@@ -4913,7 +4911,7 @@
               </a:lnSpc>
             </a:pPr>
             <a:r>
-              <a:rPr lang="en-US" sz="2400"/>
+              <a:rPr lang="en-US" sz="2400" dirty="0"/>
               <a:t>Result can be easily affected</a:t>
             </a:r>
           </a:p>
@@ -4924,8 +4922,8 @@
               </a:lnSpc>
             </a:pPr>
             <a:r>
-              <a:rPr lang="en-US" sz="2000"/>
-              <a:t>Blur Image, Low contract, Image Noise</a:t>
+              <a:rPr lang="en-US" sz="2000" dirty="0"/>
+              <a:t>Blur Image, Low contrast, Image Noise</a:t>
             </a:r>
           </a:p>
         </p:txBody>
@@ -6021,8 +6019,8 @@
           <a:p>
             <a:pPr algn="ctr"/>
             <a:r>
-              <a:rPr lang="en-US"/>
-              <a:t>The interesting implementation stuff</a:t>
+              <a:rPr lang="en-US" dirty="0"/>
+              <a:t>Implementation details</a:t>
             </a:r>
           </a:p>
         </p:txBody>

</xml_diff>